<commit_message>
Fixed suggestions from DRC. Some start on partial evaluation chapter.
</commit_message>
<xml_diff>
--- a/Figures/SynthesisingDataExtended.pptx
+++ b/Figures/SynthesisingDataExtended.pptx
@@ -288,7 +288,7 @@
           <a:p>
             <a:fld id="{47B9A199-D001-9B4E-B758-14EC809AFE55}" type="datetimeFigureOut">
               <a:rPr lang="da-DK" smtClean="0"/>
-              <a:t>17/07/14</a:t>
+              <a:t>20/07/14</a:t>
             </a:fld>
             <a:endParaRPr lang="en-GB"/>
           </a:p>
@@ -458,7 +458,7 @@
           <a:p>
             <a:fld id="{47B9A199-D001-9B4E-B758-14EC809AFE55}" type="datetimeFigureOut">
               <a:rPr lang="da-DK" smtClean="0"/>
-              <a:t>17/07/14</a:t>
+              <a:t>20/07/14</a:t>
             </a:fld>
             <a:endParaRPr lang="en-GB"/>
           </a:p>
@@ -638,7 +638,7 @@
           <a:p>
             <a:fld id="{47B9A199-D001-9B4E-B758-14EC809AFE55}" type="datetimeFigureOut">
               <a:rPr lang="da-DK" smtClean="0"/>
-              <a:t>17/07/14</a:t>
+              <a:t>20/07/14</a:t>
             </a:fld>
             <a:endParaRPr lang="en-GB"/>
           </a:p>
@@ -808,7 +808,7 @@
           <a:p>
             <a:fld id="{47B9A199-D001-9B4E-B758-14EC809AFE55}" type="datetimeFigureOut">
               <a:rPr lang="da-DK" smtClean="0"/>
-              <a:t>17/07/14</a:t>
+              <a:t>20/07/14</a:t>
             </a:fld>
             <a:endParaRPr lang="en-GB"/>
           </a:p>
@@ -1054,7 +1054,7 @@
           <a:p>
             <a:fld id="{47B9A199-D001-9B4E-B758-14EC809AFE55}" type="datetimeFigureOut">
               <a:rPr lang="da-DK" smtClean="0"/>
-              <a:t>17/07/14</a:t>
+              <a:t>20/07/14</a:t>
             </a:fld>
             <a:endParaRPr lang="en-GB"/>
           </a:p>
@@ -1342,7 +1342,7 @@
           <a:p>
             <a:fld id="{47B9A199-D001-9B4E-B758-14EC809AFE55}" type="datetimeFigureOut">
               <a:rPr lang="da-DK" smtClean="0"/>
-              <a:t>17/07/14</a:t>
+              <a:t>20/07/14</a:t>
             </a:fld>
             <a:endParaRPr lang="en-GB"/>
           </a:p>
@@ -1764,7 +1764,7 @@
           <a:p>
             <a:fld id="{47B9A199-D001-9B4E-B758-14EC809AFE55}" type="datetimeFigureOut">
               <a:rPr lang="da-DK" smtClean="0"/>
-              <a:t>17/07/14</a:t>
+              <a:t>20/07/14</a:t>
             </a:fld>
             <a:endParaRPr lang="en-GB"/>
           </a:p>
@@ -1882,7 +1882,7 @@
           <a:p>
             <a:fld id="{47B9A199-D001-9B4E-B758-14EC809AFE55}" type="datetimeFigureOut">
               <a:rPr lang="da-DK" smtClean="0"/>
-              <a:t>17/07/14</a:t>
+              <a:t>20/07/14</a:t>
             </a:fld>
             <a:endParaRPr lang="en-GB"/>
           </a:p>
@@ -1977,7 +1977,7 @@
           <a:p>
             <a:fld id="{47B9A199-D001-9B4E-B758-14EC809AFE55}" type="datetimeFigureOut">
               <a:rPr lang="da-DK" smtClean="0"/>
-              <a:t>17/07/14</a:t>
+              <a:t>20/07/14</a:t>
             </a:fld>
             <a:endParaRPr lang="en-GB"/>
           </a:p>
@@ -2254,7 +2254,7 @@
           <a:p>
             <a:fld id="{47B9A199-D001-9B4E-B758-14EC809AFE55}" type="datetimeFigureOut">
               <a:rPr lang="da-DK" smtClean="0"/>
-              <a:t>17/07/14</a:t>
+              <a:t>20/07/14</a:t>
             </a:fld>
             <a:endParaRPr lang="en-GB"/>
           </a:p>
@@ -2507,7 +2507,7 @@
           <a:p>
             <a:fld id="{47B9A199-D001-9B4E-B758-14EC809AFE55}" type="datetimeFigureOut">
               <a:rPr lang="da-DK" smtClean="0"/>
-              <a:t>17/07/14</a:t>
+              <a:t>20/07/14</a:t>
             </a:fld>
             <a:endParaRPr lang="en-GB"/>
           </a:p>
@@ -2720,7 +2720,7 @@
           <a:p>
             <a:fld id="{47B9A199-D001-9B4E-B758-14EC809AFE55}" type="datetimeFigureOut">
               <a:rPr lang="da-DK" smtClean="0"/>
-              <a:t>17/07/14</a:t>
+              <a:t>20/07/14</a:t>
             </a:fld>
             <a:endParaRPr lang="en-GB"/>
           </a:p>
@@ -3097,14 +3097,14 @@
       </p:grpSpPr>
       <p:sp>
         <p:nvSpPr>
-          <p:cNvPr id="4" name="Tekstfelt 3"/>
+          <p:cNvPr id="2" name="Tekstfelt 1"/>
           <p:cNvSpPr txBox="1"/>
           <p:nvPr/>
         </p:nvSpPr>
         <p:spPr>
           <a:xfrm>
-            <a:off x="1537033" y="3257353"/>
-            <a:ext cx="6019467" cy="646331"/>
+            <a:off x="809626" y="3333750"/>
+            <a:ext cx="7191374" cy="830997"/>
           </a:xfrm>
           <a:prstGeom prst="rect">
             <a:avLst/>
@@ -3118,7 +3118,7 @@
           <a:lstStyle/>
           <a:p>
             <a:r>
-              <a:rPr lang="en-US" b="1" dirty="0" err="1" smtClean="0">
+              <a:rPr lang="en-US" sz="2400" b="1" dirty="0" err="1">
                 <a:solidFill>
                   <a:srgbClr val="C0504D"/>
                 </a:solidFill>
@@ -3128,7 +3128,7 @@
               <a:t>Synthesise</a:t>
             </a:r>
             <a:r>
-              <a:rPr lang="en-US" b="1" dirty="0" smtClean="0">
+              <a:rPr lang="en-US" sz="2400" b="1" dirty="0">
                 <a:solidFill>
                   <a:srgbClr val="C0504D"/>
                 </a:solidFill>
@@ -3138,14 +3138,14 @@
               <a:t> </a:t>
             </a:r>
             <a:r>
-              <a:rPr lang="en-US" b="1" dirty="0" smtClean="0">
+              <a:rPr lang="en-US" sz="2400" b="1" dirty="0" smtClean="0">
                 <a:latin typeface="Lucida Console"/>
                 <a:cs typeface="Lucida Console"/>
               </a:rPr>
               <a:t>(</a:t>
             </a:r>
             <a:r>
-              <a:rPr lang="en-US" b="1" dirty="0" err="1" smtClean="0">
+              <a:rPr lang="en-US" sz="2400" b="1" dirty="0" err="1" smtClean="0">
                 <a:solidFill>
                   <a:srgbClr val="9BBB59"/>
                 </a:solidFill>
@@ -3155,31 +3155,41 @@
               <a:t>HRec</a:t>
             </a:r>
             <a:r>
-              <a:rPr lang="en-US" b="1" dirty="0" smtClean="0">
+              <a:rPr lang="en-US" sz="2400" b="1" dirty="0" smtClean="0">
                 <a:latin typeface="Lucida Console"/>
                 <a:cs typeface="Lucida Console"/>
               </a:rPr>
               <a:t> </a:t>
             </a:r>
             <a:r>
-              <a:rPr lang="en-US" b="1" dirty="0" smtClean="0">
+              <a:rPr lang="en-US" sz="2400" b="1" dirty="0" smtClean="0">
                 <a:solidFill>
                   <a:srgbClr val="D99694"/>
                 </a:solidFill>
                 <a:latin typeface="Lucida Console"/>
                 <a:cs typeface="Lucida Console"/>
               </a:rPr>
-              <a:t>j a d</a:t>
-            </a:r>
-            <a:r>
-              <a:rPr lang="en-US" b="1" dirty="0" smtClean="0">
+              <a:t>j a </a:t>
+            </a:r>
+            <a:r>
+              <a:rPr lang="en-US" sz="2400" b="1" dirty="0">
+                <a:solidFill>
+                  <a:srgbClr val="D99694"/>
+                </a:solidFill>
+                <a:latin typeface="Lucida Console"/>
+                <a:cs typeface="Lucida Console"/>
+              </a:rPr>
+              <a:t>d</a:t>
+            </a:r>
+            <a:r>
+              <a:rPr lang="en-US" sz="2400" b="1" dirty="0">
                 <a:latin typeface="Lucida Console"/>
                 <a:cs typeface="Lucida Console"/>
               </a:rPr>
               <a:t>)    </a:t>
             </a:r>
             <a:r>
-              <a:rPr lang="en-US" b="1" dirty="0" smtClean="0">
+              <a:rPr lang="en-US" sz="2400" b="1" dirty="0">
                 <a:solidFill>
                   <a:srgbClr val="D99694"/>
                 </a:solidFill>
@@ -3189,7 +3199,7 @@
               <a:t>x </a:t>
             </a:r>
             <a:r>
-              <a:rPr lang="en-US" b="1" dirty="0" err="1" smtClean="0">
+              <a:rPr lang="en-US" sz="2400" b="1" dirty="0" err="1">
                 <a:solidFill>
                   <a:srgbClr val="D99694"/>
                 </a:solidFill>
@@ -3199,7 +3209,7 @@
               <a:t>i</a:t>
             </a:r>
             <a:r>
-              <a:rPr lang="en-US" b="1" dirty="0" smtClean="0">
+              <a:rPr lang="en-US" sz="2400" b="1" dirty="0">
                 <a:solidFill>
                   <a:srgbClr val="D99694"/>
                 </a:solidFill>
@@ -3209,7 +3219,7 @@
               <a:t> </a:t>
             </a:r>
             <a:r>
-              <a:rPr lang="en-US" b="1" dirty="0" smtClean="0">
+              <a:rPr lang="en-US" sz="2400" b="1" dirty="0">
                 <a:latin typeface="Lucida Console"/>
                 <a:cs typeface="Lucida Console"/>
               </a:rPr>
@@ -3218,14 +3228,14 @@
           </a:p>
           <a:p>
             <a:r>
-              <a:rPr lang="en-US" b="1" dirty="0" smtClean="0">
+              <a:rPr lang="en-US" sz="2400" b="1" dirty="0">
                 <a:latin typeface="Lucida Console"/>
                 <a:cs typeface="Lucida Console"/>
               </a:rPr>
               <a:t>	</a:t>
             </a:r>
             <a:r>
-              <a:rPr lang="en-US" b="1" dirty="0" smtClean="0">
+              <a:rPr lang="en-US" sz="2400" b="1">
                 <a:solidFill>
                   <a:srgbClr val="558ED5"/>
                 </a:solidFill>
@@ -3235,7 +3245,7 @@
               <a:t>(</a:t>
             </a:r>
             <a:r>
-              <a:rPr lang="en-US" b="1" dirty="0" smtClean="0">
+              <a:rPr lang="en-US" sz="2400" b="1" smtClean="0">
                 <a:solidFill>
                   <a:schemeClr val="accent2">
                     <a:lumMod val="60000"/>
@@ -3248,16 +3258,19 @@
               <a:t>rec</a:t>
             </a:r>
             <a:r>
-              <a:rPr lang="en-US" b="1" dirty="0" smtClean="0">
+              <a:rPr lang="en-US" sz="2400" b="1" smtClean="0">
                 <a:latin typeface="Lucida Console"/>
                 <a:cs typeface="Lucida Console"/>
               </a:rPr>
-              <a:t> : </a:t>
-            </a:r>
-            <a:r>
-              <a:rPr lang="en-US" b="1" dirty="0" smtClean="0">
-                <a:solidFill>
-                  <a:srgbClr val="D99694"/>
+              <a:t>: </a:t>
+            </a:r>
+            <a:r>
+              <a:rPr lang="en-US" sz="2400" b="1" smtClean="0">
+                <a:solidFill>
+                  <a:schemeClr val="accent2">
+                    <a:lumMod val="60000"/>
+                    <a:lumOff val="40000"/>
+                  </a:schemeClr>
                 </a:solidFill>
                 <a:latin typeface="Lucida Console"/>
                 <a:cs typeface="Lucida Console"/>
@@ -3265,41 +3278,31 @@
               <a:t>a</a:t>
             </a:r>
             <a:r>
-              <a:rPr lang="en-US" b="1" dirty="0" smtClean="0">
-                <a:latin typeface="Lucida Console"/>
-                <a:cs typeface="Lucida Console"/>
-              </a:rPr>
-              <a:t> -&gt; </a:t>
-            </a:r>
-            <a:r>
-              <a:rPr lang="en-US" b="1" dirty="0">
-                <a:solidFill>
-                  <a:srgbClr val="D99694"/>
-                </a:solidFill>
-                <a:latin typeface="Lucida Console"/>
-                <a:cs typeface="Lucida Console"/>
-              </a:rPr>
-              <a:t>x</a:t>
-            </a:r>
-            <a:r>
-              <a:rPr lang="en-US" b="1" dirty="0" smtClean="0">
+              <a:rPr lang="en-US" sz="2400" b="1" smtClean="0">
                 <a:latin typeface="Lucida Console"/>
                 <a:cs typeface="Lucida Console"/>
               </a:rPr>
               <a:t> </a:t>
             </a:r>
             <a:r>
-              <a:rPr lang="en-US" b="1" dirty="0" smtClean="0">
-                <a:solidFill>
-                  <a:srgbClr val="D99694"/>
-                </a:solidFill>
+              <a:rPr lang="en-US" sz="2400" b="1" dirty="0" smtClean="0">
                 <a:latin typeface="Lucida Console"/>
                 <a:cs typeface="Lucida Console"/>
               </a:rPr>
-              <a:t>j </a:t>
-            </a:r>
-            <a:r>
-              <a:rPr lang="en-US" b="1" dirty="0" smtClean="0">
+              <a:t>-&gt; </a:t>
+            </a:r>
+            <a:r>
+              <a:rPr lang="en-US" sz="2400" b="1" dirty="0">
+                <a:solidFill>
+                  <a:srgbClr val="D99694"/>
+                </a:solidFill>
+                <a:latin typeface="Lucida Console"/>
+                <a:cs typeface="Lucida Console"/>
+              </a:rPr>
+              <a:t>x j </a:t>
+            </a:r>
+            <a:r>
+              <a:rPr lang="en-US" sz="2400" b="1" dirty="0">
                 <a:solidFill>
                   <a:srgbClr val="558ED5"/>
                 </a:solidFill>
@@ -3309,14 +3312,14 @@
               <a:t>**</a:t>
             </a:r>
             <a:r>
-              <a:rPr lang="en-US" b="1" dirty="0" smtClean="0">
+              <a:rPr lang="en-US" sz="2400" b="1" dirty="0">
                 <a:latin typeface="Lucida Console"/>
                 <a:cs typeface="Lucida Console"/>
               </a:rPr>
               <a:t> </a:t>
             </a:r>
             <a:r>
-              <a:rPr lang="en-US" b="1" dirty="0" err="1" smtClean="0">
+              <a:rPr lang="en-US" sz="2400" b="1" dirty="0" err="1">
                 <a:solidFill>
                   <a:srgbClr val="C0504D"/>
                 </a:solidFill>
@@ -3326,7 +3329,7 @@
               <a:t>Synthesise</a:t>
             </a:r>
             <a:r>
-              <a:rPr lang="en-US" b="1" dirty="0" smtClean="0">
+              <a:rPr lang="en-US" sz="2400" b="1" dirty="0">
                 <a:solidFill>
                   <a:srgbClr val="C0504D"/>
                 </a:solidFill>
@@ -3336,7 +3339,7 @@
               <a:t> </a:t>
             </a:r>
             <a:r>
-              <a:rPr lang="en-US" b="1" dirty="0" smtClean="0">
+              <a:rPr lang="en-US" sz="2400" b="1" dirty="0">
                 <a:solidFill>
                   <a:srgbClr val="D99694"/>
                 </a:solidFill>
@@ -3346,7 +3349,7 @@
               <a:t>d x </a:t>
             </a:r>
             <a:r>
-              <a:rPr lang="en-US" b="1" dirty="0" err="1" smtClean="0">
+              <a:rPr lang="en-US" sz="2400" b="1" dirty="0" err="1">
                 <a:solidFill>
                   <a:srgbClr val="D99694"/>
                 </a:solidFill>
@@ -3356,7 +3359,7 @@
               <a:t>i</a:t>
             </a:r>
             <a:r>
-              <a:rPr lang="en-US" b="1" dirty="0" smtClean="0">
+              <a:rPr lang="en-US" sz="2400" b="1" dirty="0">
                 <a:solidFill>
                   <a:srgbClr val="558ED5"/>
                 </a:solidFill>
@@ -3365,13 +3368,6 @@
               </a:rPr>
               <a:t>)</a:t>
             </a:r>
-            <a:endParaRPr lang="en-GB" dirty="0" smtClean="0">
-              <a:solidFill>
-                <a:srgbClr val="558ED5"/>
-              </a:solidFill>
-              <a:latin typeface="Lucida Console"/>
-              <a:cs typeface="Lucida Console"/>
-            </a:endParaRPr>
           </a:p>
         </p:txBody>
       </p:sp>

</xml_diff>